<commit_message>
Merge v and g part
</commit_message>
<xml_diff>
--- a/Technical Writing.pptx
+++ b/Technical Writing.pptx
@@ -5,10 +5,10 @@
     <p:sldMasterId id="2147483648" r:id="rId1"/>
   </p:sldMasterIdLst>
   <p:notesMasterIdLst>
-    <p:notesMasterId r:id="rId10"/>
+    <p:notesMasterId r:id="rId12"/>
   </p:notesMasterIdLst>
   <p:handoutMasterIdLst>
-    <p:handoutMasterId r:id="rId11"/>
+    <p:handoutMasterId r:id="rId13"/>
   </p:handoutMasterIdLst>
   <p:sldIdLst>
     <p:sldId id="256" r:id="rId2"/>
@@ -17,8 +17,10 @@
     <p:sldId id="259" r:id="rId5"/>
     <p:sldId id="260" r:id="rId6"/>
     <p:sldId id="261" r:id="rId7"/>
-    <p:sldId id="262" r:id="rId8"/>
-    <p:sldId id="263" r:id="rId9"/>
+    <p:sldId id="264" r:id="rId8"/>
+    <p:sldId id="265" r:id="rId9"/>
+    <p:sldId id="262" r:id="rId10"/>
+    <p:sldId id="263" r:id="rId11"/>
   </p:sldIdLst>
   <p:sldSz cx="12192000" cy="6858000"/>
   <p:notesSz cx="6858000" cy="9144000"/>
@@ -219,7 +221,7 @@
           <a:p>
             <a:fld id="{B5AD7D29-8A7B-483C-9B98-6BBE44865959}" type="datetimeFigureOut">
               <a:rPr lang="en-US" smtClean="0"/>
-              <a:t>10/23/2022</a:t>
+              <a:t>10/25/2022</a:t>
             </a:fld>
             <a:endParaRPr lang="en-US"/>
           </a:p>
@@ -397,7 +399,7 @@
           <a:p>
             <a:fld id="{672CF6B8-F790-4B13-BE9E-46D4868C8775}" type="datetimeFigureOut">
               <a:rPr lang="en-US" smtClean="0"/>
-              <a:t>10/23/2022</a:t>
+              <a:t>10/25/2022</a:t>
             </a:fld>
             <a:endParaRPr lang="en-US"/>
           </a:p>
@@ -815,7 +817,7 @@
           <a:p>
             <a:fld id="{2731F476-CD49-44C0-8845-704D45E3948B}" type="datetime1">
               <a:rPr lang="en-US" smtClean="0"/>
-              <a:t>10/23/2022</a:t>
+              <a:t>10/25/2022</a:t>
             </a:fld>
             <a:endParaRPr lang="en-US"/>
           </a:p>
@@ -1015,7 +1017,7 @@
           <a:p>
             <a:fld id="{73DB2FC6-5C5C-4C9F-9BB3-DD64828A1680}" type="datetime1">
               <a:rPr lang="en-US" smtClean="0"/>
-              <a:t>10/23/2022</a:t>
+              <a:t>10/25/2022</a:t>
             </a:fld>
             <a:endParaRPr lang="en-US"/>
           </a:p>
@@ -1225,7 +1227,7 @@
           <a:p>
             <a:fld id="{B8104205-A509-4672-A111-EB55EAD217C1}" type="datetime1">
               <a:rPr lang="en-US" smtClean="0"/>
-              <a:t>10/23/2022</a:t>
+              <a:t>10/25/2022</a:t>
             </a:fld>
             <a:endParaRPr lang="en-US"/>
           </a:p>
@@ -1425,7 +1427,7 @@
           <a:p>
             <a:fld id="{24036161-2E75-4769-92D8-591B907C90D2}" type="datetime1">
               <a:rPr lang="en-US" smtClean="0"/>
-              <a:t>10/23/2022</a:t>
+              <a:t>10/25/2022</a:t>
             </a:fld>
             <a:endParaRPr lang="en-US"/>
           </a:p>
@@ -1701,7 +1703,7 @@
           <a:p>
             <a:fld id="{CD6783BE-2C21-43CD-98C3-EF561F74AE60}" type="datetime1">
               <a:rPr lang="en-US" smtClean="0"/>
-              <a:t>10/23/2022</a:t>
+              <a:t>10/25/2022</a:t>
             </a:fld>
             <a:endParaRPr lang="en-US"/>
           </a:p>
@@ -1969,7 +1971,7 @@
           <a:p>
             <a:fld id="{3F3A51A6-C376-4395-845A-01DD5BF490ED}" type="datetime1">
               <a:rPr lang="en-US" smtClean="0"/>
-              <a:t>10/23/2022</a:t>
+              <a:t>10/25/2022</a:t>
             </a:fld>
             <a:endParaRPr lang="en-US"/>
           </a:p>
@@ -2384,7 +2386,7 @@
           <a:p>
             <a:fld id="{C9EF5DA3-AA9E-4248-B14F-470EDDD5F097}" type="datetime1">
               <a:rPr lang="en-US" smtClean="0"/>
-              <a:t>10/23/2022</a:t>
+              <a:t>10/25/2022</a:t>
             </a:fld>
             <a:endParaRPr lang="en-US"/>
           </a:p>
@@ -2526,7 +2528,7 @@
           <a:p>
             <a:fld id="{8635B365-F9F1-4DDE-8C02-311F43115B0B}" type="datetime1">
               <a:rPr lang="en-US" smtClean="0"/>
-              <a:t>10/23/2022</a:t>
+              <a:t>10/25/2022</a:t>
             </a:fld>
             <a:endParaRPr lang="en-US"/>
           </a:p>
@@ -2639,7 +2641,7 @@
           <a:p>
             <a:fld id="{D57A39D9-4CA7-4DAD-908A-5490A9115D25}" type="datetime1">
               <a:rPr lang="en-US" smtClean="0"/>
-              <a:t>10/23/2022</a:t>
+              <a:t>10/25/2022</a:t>
             </a:fld>
             <a:endParaRPr lang="en-US"/>
           </a:p>
@@ -2952,7 +2954,7 @@
           <a:p>
             <a:fld id="{0F2A8537-1E7C-488B-80BF-36D26752A4D3}" type="datetime1">
               <a:rPr lang="en-US" smtClean="0"/>
-              <a:t>10/23/2022</a:t>
+              <a:t>10/25/2022</a:t>
             </a:fld>
             <a:endParaRPr lang="en-US"/>
           </a:p>
@@ -3241,7 +3243,7 @@
           <a:p>
             <a:fld id="{56B2C35F-272C-4248-BFE8-63496E1956EC}" type="datetime1">
               <a:rPr lang="en-US" smtClean="0"/>
-              <a:t>10/23/2022</a:t>
+              <a:t>10/25/2022</a:t>
             </a:fld>
             <a:endParaRPr lang="en-US"/>
           </a:p>
@@ -3484,7 +3486,7 @@
           <a:p>
             <a:fld id="{54448C5D-8063-4E26-B05A-BBBC1BE38990}" type="datetime1">
               <a:rPr lang="en-US" smtClean="0"/>
-              <a:t>10/23/2022</a:t>
+              <a:t>10/25/2022</a:t>
             </a:fld>
             <a:endParaRPr lang="en-US"/>
           </a:p>
@@ -4278,6 +4280,180 @@
 </p:sld>
 </file>
 
+<file path=ppt/slides/slide10.xml><?xml version="1.0" encoding="utf-8"?>
+<p:sld xmlns:a="http://schemas.openxmlformats.org/drawingml/2006/main" xmlns:r="http://schemas.openxmlformats.org/officeDocument/2006/relationships" xmlns:p="http://schemas.openxmlformats.org/presentationml/2006/main">
+  <p:cSld>
+    <p:spTree>
+      <p:nvGrpSpPr>
+        <p:cNvPr id="1" name=""/>
+        <p:cNvGrpSpPr/>
+        <p:nvPr/>
+      </p:nvGrpSpPr>
+      <p:grpSpPr>
+        <a:xfrm>
+          <a:off x="0" y="0"/>
+          <a:ext cx="0" cy="0"/>
+          <a:chOff x="0" y="0"/>
+          <a:chExt cx="0" cy="0"/>
+        </a:xfrm>
+      </p:grpSpPr>
+      <p:sp>
+        <p:nvSpPr>
+          <p:cNvPr id="2" name="灯片编号占位符 1">
+            <a:extLst>
+              <a:ext uri="{FF2B5EF4-FFF2-40B4-BE49-F238E27FC236}">
+                <a16:creationId xmlns:a16="http://schemas.microsoft.com/office/drawing/2014/main" id="{BC81668E-20E5-79E8-DE3B-81399225B961}"/>
+              </a:ext>
+            </a:extLst>
+          </p:cNvPr>
+          <p:cNvSpPr>
+            <a:spLocks noGrp="1"/>
+          </p:cNvSpPr>
+          <p:nvPr>
+            <p:ph type="sldNum" sz="quarter" idx="12"/>
+          </p:nvPr>
+        </p:nvSpPr>
+        <p:spPr/>
+        <p:txBody>
+          <a:bodyPr/>
+          <a:lstStyle/>
+          <a:p>
+            <a:fld id="{91E15A72-4311-4D48-8139-6724A1CBFEF9}" type="slidenum">
+              <a:rPr lang="en-US" smtClean="0">
+                <a:solidFill>
+                  <a:schemeClr val="tx1"/>
+                </a:solidFill>
+              </a:rPr>
+              <a:t>10</a:t>
+            </a:fld>
+            <a:endParaRPr lang="en-US" dirty="0">
+              <a:solidFill>
+                <a:schemeClr val="tx1"/>
+              </a:solidFill>
+            </a:endParaRPr>
+          </a:p>
+        </p:txBody>
+      </p:sp>
+      <p:sp>
+        <p:nvSpPr>
+          <p:cNvPr id="3" name="矩形 2">
+            <a:extLst>
+              <a:ext uri="{FF2B5EF4-FFF2-40B4-BE49-F238E27FC236}">
+                <a16:creationId xmlns:a16="http://schemas.microsoft.com/office/drawing/2014/main" id="{EB18FF03-365A-DD4F-D70C-00598B219E8E}"/>
+              </a:ext>
+            </a:extLst>
+          </p:cNvPr>
+          <p:cNvSpPr/>
+          <p:nvPr/>
+        </p:nvSpPr>
+        <p:spPr>
+          <a:xfrm>
+            <a:off x="4626687" y="2690336"/>
+            <a:ext cx="2938625" cy="1477328"/>
+          </a:xfrm>
+          <a:prstGeom prst="rect">
+            <a:avLst/>
+          </a:prstGeom>
+          <a:noFill/>
+        </p:spPr>
+        <p:txBody>
+          <a:bodyPr wrap="none" lIns="91440" tIns="45720" rIns="91440" bIns="45720">
+            <a:spAutoFit/>
+          </a:bodyPr>
+          <a:lstStyle/>
+          <a:p>
+            <a:r>
+              <a:rPr lang="en-US" altLang="zh-CN" sz="9000" b="0" cap="none" spc="0" dirty="0">
+                <a:ln w="0"/>
+                <a:solidFill>
+                  <a:schemeClr val="tx1"/>
+                </a:solidFill>
+                <a:effectLst>
+                  <a:outerShdw blurRad="38100" dist="19050" dir="2700000" algn="tl" rotWithShape="0">
+                    <a:schemeClr val="dk1">
+                      <a:alpha val="40000"/>
+                    </a:schemeClr>
+                  </a:outerShdw>
+                </a:effectLst>
+              </a:rPr>
+              <a:t>Q &amp; A</a:t>
+            </a:r>
+            <a:endParaRPr lang="zh-CN" altLang="en-US" sz="9000" b="0" cap="none" spc="0" dirty="0">
+              <a:ln w="0"/>
+              <a:solidFill>
+                <a:schemeClr val="tx1"/>
+              </a:solidFill>
+              <a:effectLst>
+                <a:outerShdw blurRad="38100" dist="19050" dir="2700000" algn="tl" rotWithShape="0">
+                  <a:schemeClr val="dk1">
+                    <a:alpha val="40000"/>
+                  </a:schemeClr>
+                </a:outerShdw>
+              </a:effectLst>
+            </a:endParaRPr>
+          </a:p>
+        </p:txBody>
+      </p:sp>
+      <p:pic>
+        <p:nvPicPr>
+          <p:cNvPr id="2050" name="Picture 2" descr="🔥 Thank You Any Question Images HD Download free - Images SRkh">
+            <a:extLst>
+              <a:ext uri="{FF2B5EF4-FFF2-40B4-BE49-F238E27FC236}">
+                <a16:creationId xmlns:a16="http://schemas.microsoft.com/office/drawing/2014/main" id="{050E54E3-1C22-1484-58C7-820601438140}"/>
+              </a:ext>
+            </a:extLst>
+          </p:cNvPr>
+          <p:cNvPicPr>
+            <a:picLocks noChangeAspect="1" noChangeArrowheads="1"/>
+          </p:cNvPicPr>
+          <p:nvPr/>
+        </p:nvPicPr>
+        <p:blipFill>
+          <a:blip r:embed="rId2">
+            <a:extLst>
+              <a:ext uri="{28A0092B-C50C-407E-A947-70E740481C1C}">
+                <a14:useLocalDpi xmlns:a14="http://schemas.microsoft.com/office/drawing/2010/main" val="0"/>
+              </a:ext>
+            </a:extLst>
+          </a:blip>
+          <a:srcRect/>
+          <a:stretch>
+            <a:fillRect/>
+          </a:stretch>
+        </p:blipFill>
+        <p:spPr bwMode="auto">
+          <a:xfrm>
+            <a:off x="1656990" y="-1010010"/>
+            <a:ext cx="8878019" cy="8878019"/>
+          </a:xfrm>
+          <a:prstGeom prst="rect">
+            <a:avLst/>
+          </a:prstGeom>
+          <a:noFill/>
+          <a:extLst>
+            <a:ext uri="{909E8E84-426E-40DD-AFC4-6F175D3DCCD1}">
+              <a14:hiddenFill xmlns:a14="http://schemas.microsoft.com/office/drawing/2010/main">
+                <a:solidFill>
+                  <a:srgbClr val="FFFFFF"/>
+                </a:solidFill>
+              </a14:hiddenFill>
+            </a:ext>
+          </a:extLst>
+        </p:spPr>
+      </p:pic>
+    </p:spTree>
+    <p:extLst>
+      <p:ext uri="{BB962C8B-B14F-4D97-AF65-F5344CB8AC3E}">
+        <p14:creationId xmlns:p14="http://schemas.microsoft.com/office/powerpoint/2010/main" val="4078837619"/>
+      </p:ext>
+    </p:extLst>
+  </p:cSld>
+  <p:clrMapOvr>
+    <a:masterClrMapping/>
+  </p:clrMapOvr>
+</p:sld>
+</file>
+
 <file path=ppt/slides/slide2.xml><?xml version="1.0" encoding="utf-8"?>
 <p:sld xmlns:a="http://schemas.openxmlformats.org/drawingml/2006/main" xmlns:r="http://schemas.openxmlformats.org/officeDocument/2006/relationships" xmlns:p="http://schemas.openxmlformats.org/presentationml/2006/main">
   <p:cSld>
@@ -6163,57 +6339,20 @@
       </p:grpSpPr>
       <p:sp>
         <p:nvSpPr>
-          <p:cNvPr id="2" name="灯片编号占位符 1">
-            <a:extLst>
-              <a:ext uri="{FF2B5EF4-FFF2-40B4-BE49-F238E27FC236}">
-                <a16:creationId xmlns:a16="http://schemas.microsoft.com/office/drawing/2014/main" id="{F9D38560-D17B-1AF7-F0AE-61E35BA5CE9C}"/>
-              </a:ext>
-            </a:extLst>
-          </p:cNvPr>
-          <p:cNvSpPr>
-            <a:spLocks noGrp="1"/>
-          </p:cNvSpPr>
-          <p:nvPr>
-            <p:ph type="sldNum" sz="quarter" idx="12"/>
-          </p:nvPr>
-        </p:nvSpPr>
-        <p:spPr/>
-        <p:txBody>
-          <a:bodyPr/>
-          <a:lstStyle/>
-          <a:p>
-            <a:fld id="{91E15A72-4311-4D48-8139-6724A1CBFEF9}" type="slidenum">
-              <a:rPr lang="en-US" smtClean="0">
-                <a:solidFill>
-                  <a:schemeClr val="tx1"/>
-                </a:solidFill>
-              </a:rPr>
-              <a:t>7</a:t>
-            </a:fld>
-            <a:endParaRPr lang="en-US" dirty="0">
-              <a:solidFill>
-                <a:schemeClr val="tx1"/>
-              </a:solidFill>
-            </a:endParaRPr>
-          </a:p>
-        </p:txBody>
-      </p:sp>
-      <p:sp>
-        <p:nvSpPr>
-          <p:cNvPr id="3" name="矩形 2">
-            <a:extLst>
-              <a:ext uri="{FF2B5EF4-FFF2-40B4-BE49-F238E27FC236}">
-                <a16:creationId xmlns:a16="http://schemas.microsoft.com/office/drawing/2014/main" id="{3D7B5D06-13EF-0688-E998-76967349F968}"/>
-              </a:ext>
-            </a:extLst>
-          </p:cNvPr>
-          <p:cNvSpPr/>
+          <p:cNvPr id="4" name="文本框 3">
+            <a:extLst>
+              <a:ext uri="{FF2B5EF4-FFF2-40B4-BE49-F238E27FC236}">
+                <a16:creationId xmlns:a16="http://schemas.microsoft.com/office/drawing/2014/main" id="{55A49C74-0458-F9C3-7793-EBDEC5BE3869}"/>
+              </a:ext>
+            </a:extLst>
+          </p:cNvPr>
+          <p:cNvSpPr txBox="1"/>
           <p:nvPr/>
         </p:nvSpPr>
         <p:spPr>
           <a:xfrm>
-            <a:off x="619848" y="337005"/>
-            <a:ext cx="3257623" cy="923330"/>
+            <a:off x="58057" y="159657"/>
+            <a:ext cx="11695814" cy="1661993"/>
           </a:xfrm>
           <a:prstGeom prst="rect">
             <a:avLst/>
@@ -6221,47 +6360,144 @@
           <a:noFill/>
         </p:spPr>
         <p:txBody>
-          <a:bodyPr wrap="none" lIns="91440" tIns="45720" rIns="91440" bIns="45720">
+          <a:bodyPr wrap="square" rtlCol="0">
             <a:spAutoFit/>
           </a:bodyPr>
           <a:lstStyle/>
           <a:p>
             <a:r>
-              <a:rPr lang="en-US" altLang="zh-CN" sz="5400" b="0" cap="none" spc="0" dirty="0">
-                <a:ln w="0"/>
-                <a:solidFill>
-                  <a:schemeClr val="tx1"/>
-                </a:solidFill>
+              <a:rPr lang="en-US" altLang="zh-CN" sz="5400" dirty="0">
                 <a:effectLst>
-                  <a:outerShdw blurRad="38100" dist="19050" dir="2700000" algn="tl" rotWithShape="0">
-                    <a:schemeClr val="dk1">
-                      <a:alpha val="40000"/>
-                    </a:schemeClr>
+                  <a:outerShdw blurRad="38100" dist="38100" dir="2700000" algn="tl">
+                    <a:srgbClr val="000000">
+                      <a:alpha val="43137"/>
+                    </a:srgbClr>
                   </a:outerShdw>
                 </a:effectLst>
+                <a:cs typeface="Arial" panose="020B0604020202020204" pitchFamily="34" charset="0"/>
               </a:rPr>
-              <a:t>Conclusion</a:t>
-            </a:r>
-            <a:endParaRPr lang="zh-CN" altLang="en-US" sz="5400" b="0" cap="none" spc="0" dirty="0">
-              <a:ln w="0"/>
-              <a:solidFill>
-                <a:schemeClr val="tx1"/>
-              </a:solidFill>
-              <a:effectLst>
-                <a:outerShdw blurRad="38100" dist="19050" dir="2700000" algn="tl" rotWithShape="0">
-                  <a:schemeClr val="dk1">
-                    <a:alpha val="40000"/>
-                  </a:schemeClr>
-                </a:outerShdw>
-              </a:effectLst>
+              <a:t>Marketing(promotional activities)</a:t>
+            </a:r>
+          </a:p>
+          <a:p>
+            <a:endParaRPr lang="zh-CN" altLang="en-US" sz="4800" b="1" dirty="0">
+              <a:latin typeface="Arial" panose="020B0604020202020204" pitchFamily="34" charset="0"/>
+              <a:cs typeface="Arial" panose="020B0604020202020204" pitchFamily="34" charset="0"/>
             </a:endParaRPr>
           </a:p>
         </p:txBody>
       </p:sp>
+      <p:pic>
+        <p:nvPicPr>
+          <p:cNvPr id="7" name="图片 6">
+            <a:extLst>
+              <a:ext uri="{FF2B5EF4-FFF2-40B4-BE49-F238E27FC236}">
+                <a16:creationId xmlns:a16="http://schemas.microsoft.com/office/drawing/2014/main" id="{D181A986-CC04-467C-605A-D20FB6510B68}"/>
+              </a:ext>
+            </a:extLst>
+          </p:cNvPr>
+          <p:cNvPicPr>
+            <a:picLocks noChangeAspect="1"/>
+          </p:cNvPicPr>
+          <p:nvPr/>
+        </p:nvPicPr>
+        <p:blipFill>
+          <a:blip r:embed="rId2">
+            <a:extLst>
+              <a:ext uri="{28A0092B-C50C-407E-A947-70E740481C1C}">
+                <a14:useLocalDpi xmlns:a14="http://schemas.microsoft.com/office/drawing/2010/main" val="0"/>
+              </a:ext>
+            </a:extLst>
+          </a:blip>
+          <a:stretch>
+            <a:fillRect/>
+          </a:stretch>
+        </p:blipFill>
+        <p:spPr>
+          <a:xfrm>
+            <a:off x="7876785" y="1489770"/>
+            <a:ext cx="1890674" cy="1645587"/>
+          </a:xfrm>
+          <a:prstGeom prst="rect">
+            <a:avLst/>
+          </a:prstGeom>
+        </p:spPr>
+      </p:pic>
+      <p:pic>
+        <p:nvPicPr>
+          <p:cNvPr id="9" name="图片 8">
+            <a:extLst>
+              <a:ext uri="{FF2B5EF4-FFF2-40B4-BE49-F238E27FC236}">
+                <a16:creationId xmlns:a16="http://schemas.microsoft.com/office/drawing/2014/main" id="{DC61FDC8-6B84-B76A-05B4-1536F7A9BCFA}"/>
+              </a:ext>
+            </a:extLst>
+          </p:cNvPr>
+          <p:cNvPicPr>
+            <a:picLocks noChangeAspect="1"/>
+          </p:cNvPicPr>
+          <p:nvPr/>
+        </p:nvPicPr>
+        <p:blipFill rotWithShape="1">
+          <a:blip r:embed="rId3">
+            <a:extLst>
+              <a:ext uri="{28A0092B-C50C-407E-A947-70E740481C1C}">
+                <a14:useLocalDpi xmlns:a14="http://schemas.microsoft.com/office/drawing/2010/main" val="0"/>
+              </a:ext>
+            </a:extLst>
+          </a:blip>
+          <a:srcRect l="1738" t="255" r="5206"/>
+          <a:stretch/>
+        </p:blipFill>
+        <p:spPr>
+          <a:xfrm>
+            <a:off x="5031332" y="3265064"/>
+            <a:ext cx="7088097" cy="3175698"/>
+          </a:xfrm>
+          <a:prstGeom prst="rect">
+            <a:avLst/>
+          </a:prstGeom>
+        </p:spPr>
+      </p:pic>
+      <p:pic>
+        <p:nvPicPr>
+          <p:cNvPr id="11" name="图片 10">
+            <a:extLst>
+              <a:ext uri="{FF2B5EF4-FFF2-40B4-BE49-F238E27FC236}">
+                <a16:creationId xmlns:a16="http://schemas.microsoft.com/office/drawing/2014/main" id="{316743B3-A336-E6A8-0B51-D9D87C652D44}"/>
+              </a:ext>
+            </a:extLst>
+          </p:cNvPr>
+          <p:cNvPicPr>
+            <a:picLocks noChangeAspect="1"/>
+          </p:cNvPicPr>
+          <p:nvPr/>
+        </p:nvPicPr>
+        <p:blipFill>
+          <a:blip r:embed="rId4">
+            <a:extLst>
+              <a:ext uri="{28A0092B-C50C-407E-A947-70E740481C1C}">
+                <a14:useLocalDpi xmlns:a14="http://schemas.microsoft.com/office/drawing/2010/main" val="0"/>
+              </a:ext>
+            </a:extLst>
+          </a:blip>
+          <a:stretch>
+            <a:fillRect/>
+          </a:stretch>
+        </p:blipFill>
+        <p:spPr>
+          <a:xfrm>
+            <a:off x="242887" y="2396371"/>
+            <a:ext cx="4363307" cy="2456542"/>
+          </a:xfrm>
+          <a:prstGeom prst="rect">
+            <a:avLst/>
+          </a:prstGeom>
+        </p:spPr>
+      </p:pic>
     </p:spTree>
     <p:extLst>
       <p:ext uri="{BB962C8B-B14F-4D97-AF65-F5344CB8AC3E}">
-        <p14:creationId xmlns:p14="http://schemas.microsoft.com/office/powerpoint/2010/main" val="2070633935"/>
+        <p14:creationId xmlns:p14="http://schemas.microsoft.com/office/powerpoint/2010/main" val="3901272935"/>
       </p:ext>
     </p:extLst>
   </p:cSld>
@@ -6290,10 +6526,249 @@
       </p:grpSpPr>
       <p:sp>
         <p:nvSpPr>
+          <p:cNvPr id="4" name="文本框 3">
+            <a:extLst>
+              <a:ext uri="{FF2B5EF4-FFF2-40B4-BE49-F238E27FC236}">
+                <a16:creationId xmlns:a16="http://schemas.microsoft.com/office/drawing/2014/main" id="{8B3D6854-FC8A-F26D-A4AC-C8EA934DCD5F}"/>
+              </a:ext>
+            </a:extLst>
+          </p:cNvPr>
+          <p:cNvSpPr txBox="1"/>
+          <p:nvPr/>
+        </p:nvSpPr>
+        <p:spPr>
+          <a:xfrm>
+            <a:off x="58057" y="159657"/>
+            <a:ext cx="11695814" cy="1661993"/>
+          </a:xfrm>
+          <a:prstGeom prst="rect">
+            <a:avLst/>
+          </a:prstGeom>
+          <a:noFill/>
+        </p:spPr>
+        <p:txBody>
+          <a:bodyPr wrap="square" rtlCol="0">
+            <a:spAutoFit/>
+          </a:bodyPr>
+          <a:lstStyle/>
+          <a:p>
+            <a:r>
+              <a:rPr lang="en-US" altLang="zh-CN" sz="5400" dirty="0">
+                <a:effectLst>
+                  <a:outerShdw blurRad="38100" dist="38100" dir="2700000" algn="tl">
+                    <a:srgbClr val="000000">
+                      <a:alpha val="43137"/>
+                    </a:srgbClr>
+                  </a:outerShdw>
+                </a:effectLst>
+                <a:cs typeface="Arial" panose="020B0604020202020204" pitchFamily="34" charset="0"/>
+              </a:rPr>
+              <a:t>Marketing(coupons)</a:t>
+            </a:r>
+          </a:p>
+          <a:p>
+            <a:endParaRPr lang="zh-CN" altLang="en-US" sz="4800" b="1" dirty="0">
+              <a:latin typeface="Arial" panose="020B0604020202020204" pitchFamily="34" charset="0"/>
+              <a:cs typeface="Arial" panose="020B0604020202020204" pitchFamily="34" charset="0"/>
+            </a:endParaRPr>
+          </a:p>
+        </p:txBody>
+      </p:sp>
+      <p:pic>
+        <p:nvPicPr>
+          <p:cNvPr id="6" name="图片 5">
+            <a:extLst>
+              <a:ext uri="{FF2B5EF4-FFF2-40B4-BE49-F238E27FC236}">
+                <a16:creationId xmlns:a16="http://schemas.microsoft.com/office/drawing/2014/main" id="{BCB2F6D0-2F0C-502E-0917-A8DB30F28A94}"/>
+              </a:ext>
+            </a:extLst>
+          </p:cNvPr>
+          <p:cNvPicPr>
+            <a:picLocks noChangeAspect="1"/>
+          </p:cNvPicPr>
+          <p:nvPr/>
+        </p:nvPicPr>
+        <p:blipFill>
+          <a:blip r:embed="rId2">
+            <a:extLst>
+              <a:ext uri="{28A0092B-C50C-407E-A947-70E740481C1C}">
+                <a14:useLocalDpi xmlns:a14="http://schemas.microsoft.com/office/drawing/2010/main" val="0"/>
+              </a:ext>
+            </a:extLst>
+          </a:blip>
+          <a:stretch>
+            <a:fillRect/>
+          </a:stretch>
+        </p:blipFill>
+        <p:spPr>
+          <a:xfrm>
+            <a:off x="8581033" y="2049338"/>
+            <a:ext cx="3346622" cy="825542"/>
+          </a:xfrm>
+          <a:prstGeom prst="rect">
+            <a:avLst/>
+          </a:prstGeom>
+        </p:spPr>
+      </p:pic>
+      <p:pic>
+        <p:nvPicPr>
+          <p:cNvPr id="10" name="图片 9">
+            <a:extLst>
+              <a:ext uri="{FF2B5EF4-FFF2-40B4-BE49-F238E27FC236}">
+                <a16:creationId xmlns:a16="http://schemas.microsoft.com/office/drawing/2014/main" id="{EF69ABDC-1239-9A1B-54CF-8C42520DF89F}"/>
+              </a:ext>
+            </a:extLst>
+          </p:cNvPr>
+          <p:cNvPicPr>
+            <a:picLocks noChangeAspect="1"/>
+          </p:cNvPicPr>
+          <p:nvPr/>
+        </p:nvPicPr>
+        <p:blipFill rotWithShape="1">
+          <a:blip r:embed="rId3">
+            <a:extLst>
+              <a:ext uri="{28A0092B-C50C-407E-A947-70E740481C1C}">
+                <a14:useLocalDpi xmlns:a14="http://schemas.microsoft.com/office/drawing/2010/main" val="0"/>
+              </a:ext>
+            </a:extLst>
+          </a:blip>
+          <a:srcRect l="5728" t="12878" r="32797"/>
+          <a:stretch/>
+        </p:blipFill>
+        <p:spPr>
+          <a:xfrm>
+            <a:off x="5322320" y="2946745"/>
+            <a:ext cx="6688374" cy="2893484"/>
+          </a:xfrm>
+          <a:prstGeom prst="rect">
+            <a:avLst/>
+          </a:prstGeom>
+        </p:spPr>
+      </p:pic>
+      <p:pic>
+        <p:nvPicPr>
+          <p:cNvPr id="12" name="图片 11">
+            <a:extLst>
+              <a:ext uri="{FF2B5EF4-FFF2-40B4-BE49-F238E27FC236}">
+                <a16:creationId xmlns:a16="http://schemas.microsoft.com/office/drawing/2014/main" id="{B829170C-A8F6-3792-E05B-CA250EB895A4}"/>
+              </a:ext>
+            </a:extLst>
+          </p:cNvPr>
+          <p:cNvPicPr>
+            <a:picLocks noChangeAspect="1"/>
+          </p:cNvPicPr>
+          <p:nvPr/>
+        </p:nvPicPr>
+        <p:blipFill>
+          <a:blip r:embed="rId4">
+            <a:extLst>
+              <a:ext uri="{28A0092B-C50C-407E-A947-70E740481C1C}">
+                <a14:useLocalDpi xmlns:a14="http://schemas.microsoft.com/office/drawing/2010/main" val="0"/>
+              </a:ext>
+            </a:extLst>
+          </a:blip>
+          <a:stretch>
+            <a:fillRect/>
+          </a:stretch>
+        </p:blipFill>
+        <p:spPr>
+          <a:xfrm>
+            <a:off x="58057" y="2081282"/>
+            <a:ext cx="5047728" cy="3758947"/>
+          </a:xfrm>
+          <a:prstGeom prst="rect">
+            <a:avLst/>
+          </a:prstGeom>
+        </p:spPr>
+      </p:pic>
+      <p:sp>
+        <p:nvSpPr>
+          <p:cNvPr id="13" name="椭圆 12">
+            <a:extLst>
+              <a:ext uri="{FF2B5EF4-FFF2-40B4-BE49-F238E27FC236}">
+                <a16:creationId xmlns:a16="http://schemas.microsoft.com/office/drawing/2014/main" id="{21EE277E-8BFD-BA1E-BF7D-AB65A6DF823E}"/>
+              </a:ext>
+            </a:extLst>
+          </p:cNvPr>
+          <p:cNvSpPr/>
+          <p:nvPr/>
+        </p:nvSpPr>
+        <p:spPr>
+          <a:xfrm>
+            <a:off x="0" y="4586514"/>
+            <a:ext cx="2409372" cy="747486"/>
+          </a:xfrm>
+          <a:prstGeom prst="ellipse">
+            <a:avLst/>
+          </a:prstGeom>
+          <a:noFill/>
+          <a:ln w="28575">
+            <a:solidFill>
+              <a:srgbClr val="C00000"/>
+            </a:solidFill>
+          </a:ln>
+        </p:spPr>
+        <p:style>
+          <a:lnRef idx="2">
+            <a:schemeClr val="accent1">
+              <a:shade val="50000"/>
+            </a:schemeClr>
+          </a:lnRef>
+          <a:fillRef idx="1">
+            <a:schemeClr val="accent1"/>
+          </a:fillRef>
+          <a:effectRef idx="0">
+            <a:schemeClr val="accent1"/>
+          </a:effectRef>
+          <a:fontRef idx="minor">
+            <a:schemeClr val="lt1"/>
+          </a:fontRef>
+        </p:style>
+        <p:txBody>
+          <a:bodyPr rtlCol="0" anchor="ctr"/>
+          <a:lstStyle/>
+          <a:p>
+            <a:pPr algn="ctr"/>
+            <a:endParaRPr lang="zh-CN" altLang="en-US" dirty="0"/>
+          </a:p>
+        </p:txBody>
+      </p:sp>
+    </p:spTree>
+    <p:extLst>
+      <p:ext uri="{BB962C8B-B14F-4D97-AF65-F5344CB8AC3E}">
+        <p14:creationId xmlns:p14="http://schemas.microsoft.com/office/powerpoint/2010/main" val="2883087226"/>
+      </p:ext>
+    </p:extLst>
+  </p:cSld>
+  <p:clrMapOvr>
+    <a:masterClrMapping/>
+  </p:clrMapOvr>
+</p:sld>
+</file>
+
+<file path=ppt/slides/slide9.xml><?xml version="1.0" encoding="utf-8"?>
+<p:sld xmlns:a="http://schemas.openxmlformats.org/drawingml/2006/main" xmlns:r="http://schemas.openxmlformats.org/officeDocument/2006/relationships" xmlns:p="http://schemas.openxmlformats.org/presentationml/2006/main">
+  <p:cSld>
+    <p:spTree>
+      <p:nvGrpSpPr>
+        <p:cNvPr id="1" name=""/>
+        <p:cNvGrpSpPr/>
+        <p:nvPr/>
+      </p:nvGrpSpPr>
+      <p:grpSpPr>
+        <a:xfrm>
+          <a:off x="0" y="0"/>
+          <a:ext cx="0" cy="0"/>
+          <a:chOff x="0" y="0"/>
+          <a:chExt cx="0" cy="0"/>
+        </a:xfrm>
+      </p:grpSpPr>
+      <p:sp>
+        <p:nvSpPr>
           <p:cNvPr id="2" name="灯片编号占位符 1">
             <a:extLst>
               <a:ext uri="{FF2B5EF4-FFF2-40B4-BE49-F238E27FC236}">
-                <a16:creationId xmlns:a16="http://schemas.microsoft.com/office/drawing/2014/main" id="{BC81668E-20E5-79E8-DE3B-81399225B961}"/>
+                <a16:creationId xmlns:a16="http://schemas.microsoft.com/office/drawing/2014/main" id="{F9D38560-D17B-1AF7-F0AE-61E35BA5CE9C}"/>
               </a:ext>
             </a:extLst>
           </p:cNvPr>
@@ -6315,7 +6790,7 @@
                   <a:schemeClr val="tx1"/>
                 </a:solidFill>
               </a:rPr>
-              <a:t>8</a:t>
+              <a:t>9</a:t>
             </a:fld>
             <a:endParaRPr lang="en-US" dirty="0">
               <a:solidFill>
@@ -6330,7 +6805,7 @@
           <p:cNvPr id="3" name="矩形 2">
             <a:extLst>
               <a:ext uri="{FF2B5EF4-FFF2-40B4-BE49-F238E27FC236}">
-                <a16:creationId xmlns:a16="http://schemas.microsoft.com/office/drawing/2014/main" id="{EB18FF03-365A-DD4F-D70C-00598B219E8E}"/>
+                <a16:creationId xmlns:a16="http://schemas.microsoft.com/office/drawing/2014/main" id="{3D7B5D06-13EF-0688-E998-76967349F968}"/>
               </a:ext>
             </a:extLst>
           </p:cNvPr>
@@ -6339,8 +6814,8 @@
         </p:nvSpPr>
         <p:spPr>
           <a:xfrm>
-            <a:off x="4626687" y="2690336"/>
-            <a:ext cx="2938625" cy="1477328"/>
+            <a:off x="619848" y="337005"/>
+            <a:ext cx="3257623" cy="923330"/>
           </a:xfrm>
           <a:prstGeom prst="rect">
             <a:avLst/>
@@ -6354,7 +6829,7 @@
           <a:lstStyle/>
           <a:p>
             <a:r>
-              <a:rPr lang="en-US" altLang="zh-CN" sz="9000" b="0" cap="none" spc="0" dirty="0">
+              <a:rPr lang="en-US" altLang="zh-CN" sz="5400" b="0" cap="none" spc="0" dirty="0">
                 <a:ln w="0"/>
                 <a:solidFill>
                   <a:schemeClr val="tx1"/>
@@ -6367,9 +6842,9 @@
                   </a:outerShdw>
                 </a:effectLst>
               </a:rPr>
-              <a:t>Q &amp; A</a:t>
-            </a:r>
-            <a:endParaRPr lang="zh-CN" altLang="en-US" sz="9000" b="0" cap="none" spc="0" dirty="0">
+              <a:t>Conclusion</a:t>
+            </a:r>
+            <a:endParaRPr lang="zh-CN" altLang="en-US" sz="5400" b="0" cap="none" spc="0" dirty="0">
               <a:ln w="0"/>
               <a:solidFill>
                 <a:schemeClr val="tx1"/>
@@ -6385,57 +6860,10 @@
           </a:p>
         </p:txBody>
       </p:sp>
-      <p:pic>
-        <p:nvPicPr>
-          <p:cNvPr id="2050" name="Picture 2" descr="🔥 Thank You Any Question Images HD Download free - Images SRkh">
-            <a:extLst>
-              <a:ext uri="{FF2B5EF4-FFF2-40B4-BE49-F238E27FC236}">
-                <a16:creationId xmlns:a16="http://schemas.microsoft.com/office/drawing/2014/main" id="{050E54E3-1C22-1484-58C7-820601438140}"/>
-              </a:ext>
-            </a:extLst>
-          </p:cNvPr>
-          <p:cNvPicPr>
-            <a:picLocks noChangeAspect="1" noChangeArrowheads="1"/>
-          </p:cNvPicPr>
-          <p:nvPr/>
-        </p:nvPicPr>
-        <p:blipFill>
-          <a:blip r:embed="rId2">
-            <a:extLst>
-              <a:ext uri="{28A0092B-C50C-407E-A947-70E740481C1C}">
-                <a14:useLocalDpi xmlns:a14="http://schemas.microsoft.com/office/drawing/2010/main" val="0"/>
-              </a:ext>
-            </a:extLst>
-          </a:blip>
-          <a:srcRect/>
-          <a:stretch>
-            <a:fillRect/>
-          </a:stretch>
-        </p:blipFill>
-        <p:spPr bwMode="auto">
-          <a:xfrm>
-            <a:off x="1656990" y="-1010010"/>
-            <a:ext cx="8878019" cy="8878019"/>
-          </a:xfrm>
-          <a:prstGeom prst="rect">
-            <a:avLst/>
-          </a:prstGeom>
-          <a:noFill/>
-          <a:extLst>
-            <a:ext uri="{909E8E84-426E-40DD-AFC4-6F175D3DCCD1}">
-              <a14:hiddenFill xmlns:a14="http://schemas.microsoft.com/office/drawing/2010/main">
-                <a:solidFill>
-                  <a:srgbClr val="FFFFFF"/>
-                </a:solidFill>
-              </a14:hiddenFill>
-            </a:ext>
-          </a:extLst>
-        </p:spPr>
-      </p:pic>
     </p:spTree>
     <p:extLst>
       <p:ext uri="{BB962C8B-B14F-4D97-AF65-F5344CB8AC3E}">
-        <p14:creationId xmlns:p14="http://schemas.microsoft.com/office/powerpoint/2010/main" val="4078837619"/>
+        <p14:creationId xmlns:p14="http://schemas.microsoft.com/office/powerpoint/2010/main" val="2070633935"/>
       </p:ext>
     </p:extLst>
   </p:cSld>

</xml_diff>